<commit_message>
final project presentation; references, figures; bug fixes
</commit_message>
<xml_diff>
--- a/project6.pptx
+++ b/project6.pptx
@@ -2,7 +2,7 @@
 <file path=ppt/presentation.xml><?xml version="1.0" encoding="utf-8"?>
 <p:presentation xmlns:a="http://schemas.openxmlformats.org/drawingml/2006/main" xmlns:r="http://schemas.openxmlformats.org/officeDocument/2006/relationships" xmlns:p="http://schemas.openxmlformats.org/presentationml/2006/main" saveSubsetFonts="1" autoCompressPictures="0">
   <p:sldMasterIdLst>
-    <p:sldMasterId id="2147483648" r:id="rId1"/>
+    <p:sldMasterId id="2147483936" r:id="rId1"/>
   </p:sldMasterIdLst>
   <p:sldIdLst>
     <p:sldId id="256" r:id="rId2"/>
@@ -13,7 +13,13 @@
     <p:sldId id="260" r:id="rId7"/>
     <p:sldId id="261" r:id="rId8"/>
     <p:sldId id="262" r:id="rId9"/>
-    <p:sldId id="263" r:id="rId10"/>
+    <p:sldId id="265" r:id="rId10"/>
+    <p:sldId id="266" r:id="rId11"/>
+    <p:sldId id="267" r:id="rId12"/>
+    <p:sldId id="268" r:id="rId13"/>
+    <p:sldId id="263" r:id="rId14"/>
+    <p:sldId id="269" r:id="rId15"/>
+    <p:sldId id="270" r:id="rId16"/>
   </p:sldIdLst>
   <p:sldSz cx="9144000" cy="6858000" type="screen4x3"/>
   <p:notesSz cx="6858000" cy="9144000"/>
@@ -296,7 +302,7 @@
           <a:p>
             <a:fld id="{750112C8-EE2C-C040-954C-4F8425B06926}" type="datetimeFigureOut">
               <a:rPr lang="en-US" smtClean="0"/>
-              <a:t>6/16/12</a:t>
+              <a:t>6/19/12</a:t>
             </a:fld>
             <a:endParaRPr lang="en-US"/>
           </a:p>
@@ -347,7 +353,7 @@
     </p:spTree>
     <p:extLst>
       <p:ext uri="{BB962C8B-B14F-4D97-AF65-F5344CB8AC3E}">
-        <p14:creationId xmlns:p14="http://schemas.microsoft.com/office/powerpoint/2010/main" val="752058218"/>
+        <p14:creationId xmlns:p14="http://schemas.microsoft.com/office/powerpoint/2010/main" val="1526257268"/>
       </p:ext>
     </p:extLst>
   </p:cSld>
@@ -466,7 +472,7 @@
           <a:p>
             <a:fld id="{750112C8-EE2C-C040-954C-4F8425B06926}" type="datetimeFigureOut">
               <a:rPr lang="en-US" smtClean="0"/>
-              <a:t>6/16/12</a:t>
+              <a:t>6/19/12</a:t>
             </a:fld>
             <a:endParaRPr lang="en-US"/>
           </a:p>
@@ -517,7 +523,7 @@
     </p:spTree>
     <p:extLst>
       <p:ext uri="{BB962C8B-B14F-4D97-AF65-F5344CB8AC3E}">
-        <p14:creationId xmlns:p14="http://schemas.microsoft.com/office/powerpoint/2010/main" val="3588015724"/>
+        <p14:creationId xmlns:p14="http://schemas.microsoft.com/office/powerpoint/2010/main" val="644787098"/>
       </p:ext>
     </p:extLst>
   </p:cSld>
@@ -646,7 +652,7 @@
           <a:p>
             <a:fld id="{750112C8-EE2C-C040-954C-4F8425B06926}" type="datetimeFigureOut">
               <a:rPr lang="en-US" smtClean="0"/>
-              <a:t>6/16/12</a:t>
+              <a:t>6/19/12</a:t>
             </a:fld>
             <a:endParaRPr lang="en-US"/>
           </a:p>
@@ -697,7 +703,7 @@
     </p:spTree>
     <p:extLst>
       <p:ext uri="{BB962C8B-B14F-4D97-AF65-F5344CB8AC3E}">
-        <p14:creationId xmlns:p14="http://schemas.microsoft.com/office/powerpoint/2010/main" val="869348040"/>
+        <p14:creationId xmlns:p14="http://schemas.microsoft.com/office/powerpoint/2010/main" val="3844443563"/>
       </p:ext>
     </p:extLst>
   </p:cSld>
@@ -816,7 +822,7 @@
           <a:p>
             <a:fld id="{750112C8-EE2C-C040-954C-4F8425B06926}" type="datetimeFigureOut">
               <a:rPr lang="en-US" smtClean="0"/>
-              <a:t>6/16/12</a:t>
+              <a:t>6/19/12</a:t>
             </a:fld>
             <a:endParaRPr lang="en-US"/>
           </a:p>
@@ -867,7 +873,7 @@
     </p:spTree>
     <p:extLst>
       <p:ext uri="{BB962C8B-B14F-4D97-AF65-F5344CB8AC3E}">
-        <p14:creationId xmlns:p14="http://schemas.microsoft.com/office/powerpoint/2010/main" val="3420342848"/>
+        <p14:creationId xmlns:p14="http://schemas.microsoft.com/office/powerpoint/2010/main" val="1232988171"/>
       </p:ext>
     </p:extLst>
   </p:cSld>
@@ -1062,7 +1068,7 @@
           <a:p>
             <a:fld id="{750112C8-EE2C-C040-954C-4F8425B06926}" type="datetimeFigureOut">
               <a:rPr lang="en-US" smtClean="0"/>
-              <a:t>6/16/12</a:t>
+              <a:t>6/19/12</a:t>
             </a:fld>
             <a:endParaRPr lang="en-US"/>
           </a:p>
@@ -1113,7 +1119,7 @@
     </p:spTree>
     <p:extLst>
       <p:ext uri="{BB962C8B-B14F-4D97-AF65-F5344CB8AC3E}">
-        <p14:creationId xmlns:p14="http://schemas.microsoft.com/office/powerpoint/2010/main" val="177030747"/>
+        <p14:creationId xmlns:p14="http://schemas.microsoft.com/office/powerpoint/2010/main" val="3380421583"/>
       </p:ext>
     </p:extLst>
   </p:cSld>
@@ -1350,7 +1356,7 @@
           <a:p>
             <a:fld id="{750112C8-EE2C-C040-954C-4F8425B06926}" type="datetimeFigureOut">
               <a:rPr lang="en-US" smtClean="0"/>
-              <a:t>6/16/12</a:t>
+              <a:t>6/19/12</a:t>
             </a:fld>
             <a:endParaRPr lang="en-US"/>
           </a:p>
@@ -1401,7 +1407,7 @@
     </p:spTree>
     <p:extLst>
       <p:ext uri="{BB962C8B-B14F-4D97-AF65-F5344CB8AC3E}">
-        <p14:creationId xmlns:p14="http://schemas.microsoft.com/office/powerpoint/2010/main" val="1877356955"/>
+        <p14:creationId xmlns:p14="http://schemas.microsoft.com/office/powerpoint/2010/main" val="2878478615"/>
       </p:ext>
     </p:extLst>
   </p:cSld>
@@ -1772,7 +1778,7 @@
           <a:p>
             <a:fld id="{750112C8-EE2C-C040-954C-4F8425B06926}" type="datetimeFigureOut">
               <a:rPr lang="en-US" smtClean="0"/>
-              <a:t>6/16/12</a:t>
+              <a:t>6/19/12</a:t>
             </a:fld>
             <a:endParaRPr lang="en-US"/>
           </a:p>
@@ -1823,7 +1829,7 @@
     </p:spTree>
     <p:extLst>
       <p:ext uri="{BB962C8B-B14F-4D97-AF65-F5344CB8AC3E}">
-        <p14:creationId xmlns:p14="http://schemas.microsoft.com/office/powerpoint/2010/main" val="1465487188"/>
+        <p14:creationId xmlns:p14="http://schemas.microsoft.com/office/powerpoint/2010/main" val="3893341004"/>
       </p:ext>
     </p:extLst>
   </p:cSld>
@@ -1890,7 +1896,7 @@
           <a:p>
             <a:fld id="{750112C8-EE2C-C040-954C-4F8425B06926}" type="datetimeFigureOut">
               <a:rPr lang="en-US" smtClean="0"/>
-              <a:t>6/16/12</a:t>
+              <a:t>6/19/12</a:t>
             </a:fld>
             <a:endParaRPr lang="en-US"/>
           </a:p>
@@ -1941,7 +1947,7 @@
     </p:spTree>
     <p:extLst>
       <p:ext uri="{BB962C8B-B14F-4D97-AF65-F5344CB8AC3E}">
-        <p14:creationId xmlns:p14="http://schemas.microsoft.com/office/powerpoint/2010/main" val="4262953577"/>
+        <p14:creationId xmlns:p14="http://schemas.microsoft.com/office/powerpoint/2010/main" val="1174546935"/>
       </p:ext>
     </p:extLst>
   </p:cSld>
@@ -1985,7 +1991,7 @@
           <a:p>
             <a:fld id="{750112C8-EE2C-C040-954C-4F8425B06926}" type="datetimeFigureOut">
               <a:rPr lang="en-US" smtClean="0"/>
-              <a:t>6/16/12</a:t>
+              <a:t>6/19/12</a:t>
             </a:fld>
             <a:endParaRPr lang="en-US"/>
           </a:p>
@@ -2036,7 +2042,7 @@
     </p:spTree>
     <p:extLst>
       <p:ext uri="{BB962C8B-B14F-4D97-AF65-F5344CB8AC3E}">
-        <p14:creationId xmlns:p14="http://schemas.microsoft.com/office/powerpoint/2010/main" val="3190617076"/>
+        <p14:creationId xmlns:p14="http://schemas.microsoft.com/office/powerpoint/2010/main" val="4159734207"/>
       </p:ext>
     </p:extLst>
   </p:cSld>
@@ -2262,7 +2268,7 @@
           <a:p>
             <a:fld id="{750112C8-EE2C-C040-954C-4F8425B06926}" type="datetimeFigureOut">
               <a:rPr lang="en-US" smtClean="0"/>
-              <a:t>6/16/12</a:t>
+              <a:t>6/19/12</a:t>
             </a:fld>
             <a:endParaRPr lang="en-US"/>
           </a:p>
@@ -2313,7 +2319,7 @@
     </p:spTree>
     <p:extLst>
       <p:ext uri="{BB962C8B-B14F-4D97-AF65-F5344CB8AC3E}">
-        <p14:creationId xmlns:p14="http://schemas.microsoft.com/office/powerpoint/2010/main" val="542373793"/>
+        <p14:creationId xmlns:p14="http://schemas.microsoft.com/office/powerpoint/2010/main" val="2453027434"/>
       </p:ext>
     </p:extLst>
   </p:cSld>
@@ -2515,7 +2521,7 @@
           <a:p>
             <a:fld id="{750112C8-EE2C-C040-954C-4F8425B06926}" type="datetimeFigureOut">
               <a:rPr lang="en-US" smtClean="0"/>
-              <a:t>6/16/12</a:t>
+              <a:t>6/19/12</a:t>
             </a:fld>
             <a:endParaRPr lang="en-US"/>
           </a:p>
@@ -2566,7 +2572,7 @@
     </p:spTree>
     <p:extLst>
       <p:ext uri="{BB962C8B-B14F-4D97-AF65-F5344CB8AC3E}">
-        <p14:creationId xmlns:p14="http://schemas.microsoft.com/office/powerpoint/2010/main" val="4069776173"/>
+        <p14:creationId xmlns:p14="http://schemas.microsoft.com/office/powerpoint/2010/main" val="3518662736"/>
       </p:ext>
     </p:extLst>
   </p:cSld>
@@ -2728,7 +2734,7 @@
           <a:p>
             <a:fld id="{750112C8-EE2C-C040-954C-4F8425B06926}" type="datetimeFigureOut">
               <a:rPr lang="en-US" smtClean="0"/>
-              <a:t>6/16/12</a:t>
+              <a:t>6/19/12</a:t>
             </a:fld>
             <a:endParaRPr lang="en-US"/>
           </a:p>
@@ -2815,23 +2821,23 @@
     </p:spTree>
     <p:extLst>
       <p:ext uri="{BB962C8B-B14F-4D97-AF65-F5344CB8AC3E}">
-        <p14:creationId xmlns:p14="http://schemas.microsoft.com/office/powerpoint/2010/main" val="1644274139"/>
+        <p14:creationId xmlns:p14="http://schemas.microsoft.com/office/powerpoint/2010/main" val="2435661895"/>
       </p:ext>
     </p:extLst>
   </p:cSld>
   <p:clrMap bg1="lt1" tx1="dk1" bg2="lt2" tx2="dk2" accent1="accent1" accent2="accent2" accent3="accent3" accent4="accent4" accent5="accent5" accent6="accent6" hlink="hlink" folHlink="folHlink"/>
   <p:sldLayoutIdLst>
-    <p:sldLayoutId id="2147483649" r:id="rId1"/>
-    <p:sldLayoutId id="2147483650" r:id="rId2"/>
-    <p:sldLayoutId id="2147483651" r:id="rId3"/>
-    <p:sldLayoutId id="2147483652" r:id="rId4"/>
-    <p:sldLayoutId id="2147483653" r:id="rId5"/>
-    <p:sldLayoutId id="2147483654" r:id="rId6"/>
-    <p:sldLayoutId id="2147483655" r:id="rId7"/>
-    <p:sldLayoutId id="2147483656" r:id="rId8"/>
-    <p:sldLayoutId id="2147483657" r:id="rId9"/>
-    <p:sldLayoutId id="2147483658" r:id="rId10"/>
-    <p:sldLayoutId id="2147483659" r:id="rId11"/>
+    <p:sldLayoutId id="2147483937" r:id="rId1"/>
+    <p:sldLayoutId id="2147483938" r:id="rId2"/>
+    <p:sldLayoutId id="2147483939" r:id="rId3"/>
+    <p:sldLayoutId id="2147483940" r:id="rId4"/>
+    <p:sldLayoutId id="2147483941" r:id="rId5"/>
+    <p:sldLayoutId id="2147483942" r:id="rId6"/>
+    <p:sldLayoutId id="2147483943" r:id="rId7"/>
+    <p:sldLayoutId id="2147483944" r:id="rId8"/>
+    <p:sldLayoutId id="2147483945" r:id="rId9"/>
+    <p:sldLayoutId id="2147483946" r:id="rId10"/>
+    <p:sldLayoutId id="2147483947" r:id="rId11"/>
   </p:sldLayoutIdLst>
   <p:txStyles>
     <p:titleStyle>
@@ -3115,7 +3121,9 @@
         </p:nvSpPr>
         <p:spPr/>
         <p:txBody>
-          <a:bodyPr/>
+          <a:bodyPr>
+            <a:normAutofit/>
+          </a:bodyPr>
           <a:lstStyle/>
           <a:p>
             <a:r>
@@ -3143,13 +3151,23 @@
         <p:spPr/>
         <p:txBody>
           <a:bodyPr>
-            <a:normAutofit fontScale="85000" lnSpcReduction="20000"/>
+            <a:normAutofit fontScale="70000" lnSpcReduction="20000"/>
           </a:bodyPr>
           <a:lstStyle/>
           <a:p>
             <a:r>
               <a:rPr lang="en-US" dirty="0" smtClean="0"/>
-              <a:t>Bioinformatics II Presentation</a:t>
+              <a:t>Bioinformatics II </a:t>
+            </a:r>
+            <a:r>
+              <a:rPr lang="en-US" dirty="0" smtClean="0"/>
+              <a:t>Presentation</a:t>
+            </a:r>
+          </a:p>
+          <a:p>
+            <a:r>
+              <a:rPr lang="en-US" dirty="0" smtClean="0"/>
+              <a:t>June 20, 2012</a:t>
             </a:r>
             <a:endParaRPr lang="en-US" dirty="0" smtClean="0"/>
           </a:p>
@@ -3197,6 +3215,1168 @@
   <p:clrMapOvr>
     <a:masterClrMapping/>
   </p:clrMapOvr>
+  <p:timing>
+    <p:tnLst>
+      <p:par>
+        <p:cTn xmlns:p14="http://schemas.microsoft.com/office/powerpoint/2010/main" id="1" dur="indefinite" restart="never" nodeType="tmRoot"/>
+      </p:par>
+    </p:tnLst>
+  </p:timing>
+</p:sld>
+</file>
+
+<file path=ppt/slides/slide10.xml><?xml version="1.0" encoding="utf-8"?>
+<p:sld xmlns:a="http://schemas.openxmlformats.org/drawingml/2006/main" xmlns:r="http://schemas.openxmlformats.org/officeDocument/2006/relationships" xmlns:p="http://schemas.openxmlformats.org/presentationml/2006/main">
+  <p:cSld>
+    <p:spTree>
+      <p:nvGrpSpPr>
+        <p:cNvPr id="1" name=""/>
+        <p:cNvGrpSpPr/>
+        <p:nvPr/>
+      </p:nvGrpSpPr>
+      <p:grpSpPr>
+        <a:xfrm>
+          <a:off x="0" y="0"/>
+          <a:ext cx="0" cy="0"/>
+          <a:chOff x="0" y="0"/>
+          <a:chExt cx="0" cy="0"/>
+        </a:xfrm>
+      </p:grpSpPr>
+      <p:sp>
+        <p:nvSpPr>
+          <p:cNvPr id="2" name="Title 1"/>
+          <p:cNvSpPr>
+            <a:spLocks noGrp="1"/>
+          </p:cNvSpPr>
+          <p:nvPr>
+            <p:ph type="title"/>
+          </p:nvPr>
+        </p:nvSpPr>
+        <p:spPr/>
+        <p:txBody>
+          <a:bodyPr/>
+          <a:lstStyle/>
+          <a:p>
+            <a:r>
+              <a:rPr lang="en-US" dirty="0" smtClean="0"/>
+              <a:t>Results: Prediction checks</a:t>
+            </a:r>
+            <a:endParaRPr lang="en-US" dirty="0"/>
+          </a:p>
+        </p:txBody>
+      </p:sp>
+      <p:sp>
+        <p:nvSpPr>
+          <p:cNvPr id="4" name="Content Placeholder 3"/>
+          <p:cNvSpPr>
+            <a:spLocks noGrp="1"/>
+          </p:cNvSpPr>
+          <p:nvPr>
+            <p:ph sz="half" idx="1"/>
+          </p:nvPr>
+        </p:nvSpPr>
+        <p:spPr/>
+        <p:txBody>
+          <a:bodyPr>
+            <a:normAutofit/>
+          </a:bodyPr>
+          <a:lstStyle/>
+          <a:p>
+            <a:r>
+              <a:rPr lang="en-US" dirty="0" smtClean="0"/>
+              <a:t>Top: 1yje:A (red) fitted onto two templates (1ovl:A and 1pdu:A)</a:t>
+            </a:r>
+          </a:p>
+          <a:p>
+            <a:r>
+              <a:rPr lang="en-US" dirty="0" smtClean="0"/>
+              <a:t>Bottom: Predicted structure (red) compared to real one</a:t>
+            </a:r>
+          </a:p>
+          <a:p>
+            <a:r>
+              <a:rPr lang="en-US" dirty="0" smtClean="0"/>
+              <a:t>Loop fitting appears to have improved slightly</a:t>
+            </a:r>
+          </a:p>
+          <a:p>
+            <a:r>
+              <a:rPr lang="en-US" dirty="0" smtClean="0"/>
+              <a:t>DOPE score: -31385</a:t>
+            </a:r>
+            <a:endParaRPr lang="en-US" dirty="0"/>
+          </a:p>
+        </p:txBody>
+      </p:sp>
+      <p:pic>
+        <p:nvPicPr>
+          <p:cNvPr id="5" name="Picture 4"/>
+          <p:cNvPicPr>
+            <a:picLocks noChangeAspect="1"/>
+          </p:cNvPicPr>
+          <p:nvPr/>
+        </p:nvPicPr>
+        <p:blipFill>
+          <a:blip r:embed="rId2"/>
+          <a:stretch>
+            <a:fillRect/>
+          </a:stretch>
+        </p:blipFill>
+        <p:spPr>
+          <a:xfrm>
+            <a:off x="4524429" y="1600200"/>
+            <a:ext cx="2339985" cy="2339985"/>
+          </a:xfrm>
+          <a:prstGeom prst="rect">
+            <a:avLst/>
+          </a:prstGeom>
+        </p:spPr>
+      </p:pic>
+      <p:pic>
+        <p:nvPicPr>
+          <p:cNvPr id="6" name="Picture 5"/>
+          <p:cNvPicPr>
+            <a:picLocks noChangeAspect="1"/>
+          </p:cNvPicPr>
+          <p:nvPr/>
+        </p:nvPicPr>
+        <p:blipFill>
+          <a:blip r:embed="rId3"/>
+          <a:stretch>
+            <a:fillRect/>
+          </a:stretch>
+        </p:blipFill>
+        <p:spPr>
+          <a:xfrm>
+            <a:off x="4681644" y="3856444"/>
+            <a:ext cx="2182770" cy="2182770"/>
+          </a:xfrm>
+          <a:prstGeom prst="rect">
+            <a:avLst/>
+          </a:prstGeom>
+        </p:spPr>
+      </p:pic>
+    </p:spTree>
+    <p:extLst>
+      <p:ext uri="{BB962C8B-B14F-4D97-AF65-F5344CB8AC3E}">
+        <p14:creationId xmlns:p14="http://schemas.microsoft.com/office/powerpoint/2010/main" val="3816824632"/>
+      </p:ext>
+    </p:extLst>
+  </p:cSld>
+  <p:clrMapOvr>
+    <a:masterClrMapping/>
+  </p:clrMapOvr>
+  <p:timing>
+    <p:tnLst>
+      <p:par>
+        <p:cTn xmlns:p14="http://schemas.microsoft.com/office/powerpoint/2010/main" id="1" dur="indefinite" restart="never" nodeType="tmRoot"/>
+      </p:par>
+    </p:tnLst>
+  </p:timing>
+</p:sld>
+</file>
+
+<file path=ppt/slides/slide11.xml><?xml version="1.0" encoding="utf-8"?>
+<p:sld xmlns:a="http://schemas.openxmlformats.org/drawingml/2006/main" xmlns:r="http://schemas.openxmlformats.org/officeDocument/2006/relationships" xmlns:p="http://schemas.openxmlformats.org/presentationml/2006/main">
+  <p:cSld>
+    <p:spTree>
+      <p:nvGrpSpPr>
+        <p:cNvPr id="1" name=""/>
+        <p:cNvGrpSpPr/>
+        <p:nvPr/>
+      </p:nvGrpSpPr>
+      <p:grpSpPr>
+        <a:xfrm>
+          <a:off x="0" y="0"/>
+          <a:ext cx="0" cy="0"/>
+          <a:chOff x="0" y="0"/>
+          <a:chExt cx="0" cy="0"/>
+        </a:xfrm>
+      </p:grpSpPr>
+      <p:sp>
+        <p:nvSpPr>
+          <p:cNvPr id="2" name="Title 1"/>
+          <p:cNvSpPr>
+            <a:spLocks noGrp="1"/>
+          </p:cNvSpPr>
+          <p:nvPr>
+            <p:ph type="title"/>
+          </p:nvPr>
+        </p:nvSpPr>
+        <p:spPr/>
+        <p:txBody>
+          <a:bodyPr/>
+          <a:lstStyle/>
+          <a:p>
+            <a:r>
+              <a:rPr lang="en-US" dirty="0" smtClean="0"/>
+              <a:t>Results: Prediction checks</a:t>
+            </a:r>
+            <a:endParaRPr lang="en-US" dirty="0"/>
+          </a:p>
+        </p:txBody>
+      </p:sp>
+      <p:sp>
+        <p:nvSpPr>
+          <p:cNvPr id="4" name="Content Placeholder 3"/>
+          <p:cNvSpPr>
+            <a:spLocks noGrp="1"/>
+          </p:cNvSpPr>
+          <p:nvPr>
+            <p:ph sz="half" idx="1"/>
+          </p:nvPr>
+        </p:nvSpPr>
+        <p:spPr/>
+        <p:txBody>
+          <a:bodyPr>
+            <a:normAutofit/>
+          </a:bodyPr>
+          <a:lstStyle/>
+          <a:p>
+            <a:r>
+              <a:rPr lang="en-US" dirty="0" smtClean="0"/>
+              <a:t>Top: 1yje:A (red) fitted onto five templates</a:t>
+            </a:r>
+          </a:p>
+          <a:p>
+            <a:r>
+              <a:rPr lang="en-US" dirty="0" smtClean="0"/>
+              <a:t>Bottom: Predicted structure (red) compared to real one</a:t>
+            </a:r>
+          </a:p>
+          <a:p>
+            <a:r>
+              <a:rPr lang="en-US" dirty="0" smtClean="0"/>
+              <a:t>Loop fitting is now pretty good, overall</a:t>
+            </a:r>
+          </a:p>
+          <a:p>
+            <a:r>
+              <a:rPr lang="en-US" dirty="0" smtClean="0"/>
+              <a:t>DOPE score: -30780</a:t>
+            </a:r>
+            <a:endParaRPr lang="en-US" dirty="0"/>
+          </a:p>
+        </p:txBody>
+      </p:sp>
+      <p:pic>
+        <p:nvPicPr>
+          <p:cNvPr id="3" name="Picture 2"/>
+          <p:cNvPicPr>
+            <a:picLocks noChangeAspect="1"/>
+          </p:cNvPicPr>
+          <p:nvPr/>
+        </p:nvPicPr>
+        <p:blipFill>
+          <a:blip r:embed="rId2"/>
+          <a:stretch>
+            <a:fillRect/>
+          </a:stretch>
+        </p:blipFill>
+        <p:spPr>
+          <a:xfrm>
+            <a:off x="4495800" y="1487831"/>
+            <a:ext cx="2368613" cy="2368613"/>
+          </a:xfrm>
+          <a:prstGeom prst="rect">
+            <a:avLst/>
+          </a:prstGeom>
+        </p:spPr>
+      </p:pic>
+      <p:pic>
+        <p:nvPicPr>
+          <p:cNvPr id="7" name="Picture 6"/>
+          <p:cNvPicPr>
+            <a:picLocks noChangeAspect="1"/>
+          </p:cNvPicPr>
+          <p:nvPr/>
+        </p:nvPicPr>
+        <p:blipFill>
+          <a:blip r:embed="rId3"/>
+          <a:stretch>
+            <a:fillRect/>
+          </a:stretch>
+        </p:blipFill>
+        <p:spPr>
+          <a:xfrm>
+            <a:off x="4701232" y="3856445"/>
+            <a:ext cx="2163182" cy="2163182"/>
+          </a:xfrm>
+          <a:prstGeom prst="rect">
+            <a:avLst/>
+          </a:prstGeom>
+        </p:spPr>
+      </p:pic>
+    </p:spTree>
+    <p:extLst>
+      <p:ext uri="{BB962C8B-B14F-4D97-AF65-F5344CB8AC3E}">
+        <p14:creationId xmlns:p14="http://schemas.microsoft.com/office/powerpoint/2010/main" val="3733571010"/>
+      </p:ext>
+    </p:extLst>
+  </p:cSld>
+  <p:clrMapOvr>
+    <a:masterClrMapping/>
+  </p:clrMapOvr>
+  <p:timing>
+    <p:tnLst>
+      <p:par>
+        <p:cTn xmlns:p14="http://schemas.microsoft.com/office/powerpoint/2010/main" id="1" dur="indefinite" restart="never" nodeType="tmRoot"/>
+      </p:par>
+    </p:tnLst>
+  </p:timing>
+</p:sld>
+</file>
+
+<file path=ppt/slides/slide12.xml><?xml version="1.0" encoding="utf-8"?>
+<p:sld xmlns:a="http://schemas.openxmlformats.org/drawingml/2006/main" xmlns:r="http://schemas.openxmlformats.org/officeDocument/2006/relationships" xmlns:p="http://schemas.openxmlformats.org/presentationml/2006/main">
+  <p:cSld>
+    <p:spTree>
+      <p:nvGrpSpPr>
+        <p:cNvPr id="1" name=""/>
+        <p:cNvGrpSpPr/>
+        <p:nvPr/>
+      </p:nvGrpSpPr>
+      <p:grpSpPr>
+        <a:xfrm>
+          <a:off x="0" y="0"/>
+          <a:ext cx="0" cy="0"/>
+          <a:chOff x="0" y="0"/>
+          <a:chExt cx="0" cy="0"/>
+        </a:xfrm>
+      </p:grpSpPr>
+      <p:sp>
+        <p:nvSpPr>
+          <p:cNvPr id="2" name="Title 1"/>
+          <p:cNvSpPr>
+            <a:spLocks noGrp="1"/>
+          </p:cNvSpPr>
+          <p:nvPr>
+            <p:ph type="title"/>
+          </p:nvPr>
+        </p:nvSpPr>
+        <p:spPr/>
+        <p:txBody>
+          <a:bodyPr/>
+          <a:lstStyle/>
+          <a:p>
+            <a:r>
+              <a:rPr lang="en-US" dirty="0" smtClean="0"/>
+              <a:t>Results: Prediction checks</a:t>
+            </a:r>
+            <a:endParaRPr lang="en-US" dirty="0"/>
+          </a:p>
+        </p:txBody>
+      </p:sp>
+      <p:sp>
+        <p:nvSpPr>
+          <p:cNvPr id="4" name="Content Placeholder 3"/>
+          <p:cNvSpPr>
+            <a:spLocks noGrp="1"/>
+          </p:cNvSpPr>
+          <p:nvPr>
+            <p:ph sz="half" idx="1"/>
+          </p:nvPr>
+        </p:nvSpPr>
+        <p:spPr/>
+        <p:txBody>
+          <a:bodyPr>
+            <a:normAutofit/>
+          </a:bodyPr>
+          <a:lstStyle/>
+          <a:p>
+            <a:r>
+              <a:rPr lang="en-US" dirty="0" smtClean="0"/>
+              <a:t>Top: 1yje:A (red) fitted onto fifteen templates</a:t>
+            </a:r>
+          </a:p>
+          <a:p>
+            <a:r>
+              <a:rPr lang="en-US" dirty="0" smtClean="0"/>
+              <a:t>Bottom: Predicted structure (red) compared to real one</a:t>
+            </a:r>
+          </a:p>
+          <a:p>
+            <a:r>
+              <a:rPr lang="en-US" dirty="0" smtClean="0"/>
+              <a:t>There appear to be diminishing returns</a:t>
+            </a:r>
+          </a:p>
+          <a:p>
+            <a:r>
+              <a:rPr lang="en-US" dirty="0" smtClean="0"/>
+              <a:t>DOPE score: -21209</a:t>
+            </a:r>
+          </a:p>
+          <a:p>
+            <a:r>
+              <a:rPr lang="en-US" dirty="0" smtClean="0"/>
+              <a:t>Notice the jump!</a:t>
+            </a:r>
+            <a:endParaRPr lang="en-US" dirty="0"/>
+          </a:p>
+        </p:txBody>
+      </p:sp>
+      <p:pic>
+        <p:nvPicPr>
+          <p:cNvPr id="5" name="Picture 4"/>
+          <p:cNvPicPr>
+            <a:picLocks noChangeAspect="1"/>
+          </p:cNvPicPr>
+          <p:nvPr/>
+        </p:nvPicPr>
+        <p:blipFill>
+          <a:blip r:embed="rId2"/>
+          <a:stretch>
+            <a:fillRect/>
+          </a:stretch>
+        </p:blipFill>
+        <p:spPr>
+          <a:xfrm>
+            <a:off x="4831961" y="1600200"/>
+            <a:ext cx="2825077" cy="2367510"/>
+          </a:xfrm>
+          <a:prstGeom prst="rect">
+            <a:avLst/>
+          </a:prstGeom>
+        </p:spPr>
+      </p:pic>
+      <p:pic>
+        <p:nvPicPr>
+          <p:cNvPr id="6" name="Picture 5"/>
+          <p:cNvPicPr>
+            <a:picLocks noChangeAspect="1"/>
+          </p:cNvPicPr>
+          <p:nvPr/>
+        </p:nvPicPr>
+        <p:blipFill>
+          <a:blip r:embed="rId3"/>
+          <a:stretch>
+            <a:fillRect/>
+          </a:stretch>
+        </p:blipFill>
+        <p:spPr>
+          <a:xfrm>
+            <a:off x="4495800" y="3651375"/>
+            <a:ext cx="2511341" cy="2409346"/>
+          </a:xfrm>
+          <a:prstGeom prst="rect">
+            <a:avLst/>
+          </a:prstGeom>
+        </p:spPr>
+      </p:pic>
+    </p:spTree>
+    <p:extLst>
+      <p:ext uri="{BB962C8B-B14F-4D97-AF65-F5344CB8AC3E}">
+        <p14:creationId xmlns:p14="http://schemas.microsoft.com/office/powerpoint/2010/main" val="826879544"/>
+      </p:ext>
+    </p:extLst>
+  </p:cSld>
+  <p:clrMapOvr>
+    <a:masterClrMapping/>
+  </p:clrMapOvr>
+  <p:timing>
+    <p:tnLst>
+      <p:par>
+        <p:cTn xmlns:p14="http://schemas.microsoft.com/office/powerpoint/2010/main" id="1" dur="indefinite" restart="never" nodeType="tmRoot"/>
+      </p:par>
+    </p:tnLst>
+  </p:timing>
+</p:sld>
+</file>
+
+<file path=ppt/slides/slide13.xml><?xml version="1.0" encoding="utf-8"?>
+<p:sld xmlns:a="http://schemas.openxmlformats.org/drawingml/2006/main" xmlns:r="http://schemas.openxmlformats.org/officeDocument/2006/relationships" xmlns:p="http://schemas.openxmlformats.org/presentationml/2006/main">
+  <p:cSld>
+    <p:spTree>
+      <p:nvGrpSpPr>
+        <p:cNvPr id="1" name=""/>
+        <p:cNvGrpSpPr/>
+        <p:nvPr/>
+      </p:nvGrpSpPr>
+      <p:grpSpPr>
+        <a:xfrm>
+          <a:off x="0" y="0"/>
+          <a:ext cx="0" cy="0"/>
+          <a:chOff x="0" y="0"/>
+          <a:chExt cx="0" cy="0"/>
+        </a:xfrm>
+      </p:grpSpPr>
+      <p:sp>
+        <p:nvSpPr>
+          <p:cNvPr id="2" name="Title 1"/>
+          <p:cNvSpPr>
+            <a:spLocks noGrp="1"/>
+          </p:cNvSpPr>
+          <p:nvPr>
+            <p:ph type="title"/>
+          </p:nvPr>
+        </p:nvSpPr>
+        <p:spPr/>
+        <p:txBody>
+          <a:bodyPr/>
+          <a:lstStyle/>
+          <a:p>
+            <a:r>
+              <a:rPr lang="en-US" dirty="0" smtClean="0"/>
+              <a:t>Conclusions</a:t>
+            </a:r>
+            <a:endParaRPr lang="en-US" dirty="0"/>
+          </a:p>
+        </p:txBody>
+      </p:sp>
+      <p:sp>
+        <p:nvSpPr>
+          <p:cNvPr id="3" name="Content Placeholder 2"/>
+          <p:cNvSpPr>
+            <a:spLocks noGrp="1"/>
+          </p:cNvSpPr>
+          <p:nvPr>
+            <p:ph idx="1"/>
+          </p:nvPr>
+        </p:nvSpPr>
+        <p:spPr/>
+        <p:txBody>
+          <a:bodyPr>
+            <a:normAutofit lnSpcReduction="10000"/>
+          </a:bodyPr>
+          <a:lstStyle/>
+          <a:p>
+            <a:r>
+              <a:rPr lang="en-US" dirty="0" err="1" smtClean="0"/>
+              <a:t>Modeller</a:t>
+            </a:r>
+            <a:r>
+              <a:rPr lang="en-US" dirty="0" smtClean="0"/>
+              <a:t> can accurate predict secondary structures and even loop regions</a:t>
+            </a:r>
+          </a:p>
+          <a:p>
+            <a:pPr lvl="1"/>
+            <a:r>
+              <a:rPr lang="en-US" dirty="0" smtClean="0"/>
+              <a:t>Performs well when it doesn’t get confused</a:t>
+            </a:r>
+          </a:p>
+          <a:p>
+            <a:pPr lvl="1"/>
+            <a:r>
+              <a:rPr lang="en-US" dirty="0" smtClean="0"/>
+              <a:t>Some level of skill is needed in selecting matches</a:t>
+            </a:r>
+          </a:p>
+          <a:p>
+            <a:r>
+              <a:rPr lang="en-US" dirty="0" smtClean="0"/>
+              <a:t>Current PDB may be enough to solve structure prediction problem (Zhang 2005)</a:t>
+            </a:r>
+          </a:p>
+          <a:p>
+            <a:pPr lvl="1"/>
+            <a:r>
+              <a:rPr lang="en-US" dirty="0"/>
+              <a:t>Homology modeling may be the way of the future; alignment and selection are limiting</a:t>
+            </a:r>
+          </a:p>
+          <a:p>
+            <a:pPr lvl="1"/>
+            <a:r>
+              <a:rPr lang="en-US" dirty="0" smtClean="0"/>
+              <a:t>Just a bit too ambitious</a:t>
+            </a:r>
+            <a:endParaRPr lang="en-US" dirty="0"/>
+          </a:p>
+        </p:txBody>
+      </p:sp>
+    </p:spTree>
+    <p:extLst>
+      <p:ext uri="{BB962C8B-B14F-4D97-AF65-F5344CB8AC3E}">
+        <p14:creationId xmlns:p14="http://schemas.microsoft.com/office/powerpoint/2010/main" val="3602655252"/>
+      </p:ext>
+    </p:extLst>
+  </p:cSld>
+  <p:clrMapOvr>
+    <a:masterClrMapping/>
+  </p:clrMapOvr>
+  <p:timing>
+    <p:tnLst>
+      <p:par>
+        <p:cTn xmlns:p14="http://schemas.microsoft.com/office/powerpoint/2010/main" id="1" dur="indefinite" restart="never" nodeType="tmRoot"/>
+      </p:par>
+    </p:tnLst>
+  </p:timing>
+</p:sld>
+</file>
+
+<file path=ppt/slides/slide14.xml><?xml version="1.0" encoding="utf-8"?>
+<p:sld xmlns:a="http://schemas.openxmlformats.org/drawingml/2006/main" xmlns:r="http://schemas.openxmlformats.org/officeDocument/2006/relationships" xmlns:p="http://schemas.openxmlformats.org/presentationml/2006/main">
+  <p:cSld>
+    <p:spTree>
+      <p:nvGrpSpPr>
+        <p:cNvPr id="1" name=""/>
+        <p:cNvGrpSpPr/>
+        <p:nvPr/>
+      </p:nvGrpSpPr>
+      <p:grpSpPr>
+        <a:xfrm>
+          <a:off x="0" y="0"/>
+          <a:ext cx="0" cy="0"/>
+          <a:chOff x="0" y="0"/>
+          <a:chExt cx="0" cy="0"/>
+        </a:xfrm>
+      </p:grpSpPr>
+      <p:sp>
+        <p:nvSpPr>
+          <p:cNvPr id="2" name="Title 1"/>
+          <p:cNvSpPr>
+            <a:spLocks noGrp="1"/>
+          </p:cNvSpPr>
+          <p:nvPr>
+            <p:ph type="title"/>
+          </p:nvPr>
+        </p:nvSpPr>
+        <p:spPr/>
+        <p:txBody>
+          <a:bodyPr/>
+          <a:lstStyle/>
+          <a:p>
+            <a:r>
+              <a:rPr lang="en-US" dirty="0" smtClean="0"/>
+              <a:t>Acknowledgments</a:t>
+            </a:r>
+            <a:endParaRPr lang="en-US" dirty="0"/>
+          </a:p>
+        </p:txBody>
+      </p:sp>
+      <p:sp>
+        <p:nvSpPr>
+          <p:cNvPr id="3" name="Content Placeholder 2"/>
+          <p:cNvSpPr>
+            <a:spLocks noGrp="1"/>
+          </p:cNvSpPr>
+          <p:nvPr>
+            <p:ph idx="1"/>
+          </p:nvPr>
+        </p:nvSpPr>
+        <p:spPr/>
+        <p:txBody>
+          <a:bodyPr/>
+          <a:lstStyle/>
+          <a:p>
+            <a:r>
+              <a:rPr lang="en-US" dirty="0" smtClean="0"/>
+              <a:t>Dr. Sven </a:t>
+            </a:r>
+            <a:r>
+              <a:rPr lang="en-US" dirty="0" err="1" smtClean="0"/>
+              <a:t>Nahnsen</a:t>
+            </a:r>
+            <a:endParaRPr lang="en-US" dirty="0" smtClean="0"/>
+          </a:p>
+          <a:p>
+            <a:r>
+              <a:rPr lang="en-US" dirty="0" smtClean="0"/>
+              <a:t>Remainder of the Bio II class</a:t>
+            </a:r>
+            <a:endParaRPr lang="en-US" dirty="0"/>
+          </a:p>
+        </p:txBody>
+      </p:sp>
+    </p:spTree>
+    <p:extLst>
+      <p:ext uri="{BB962C8B-B14F-4D97-AF65-F5344CB8AC3E}">
+        <p14:creationId xmlns:p14="http://schemas.microsoft.com/office/powerpoint/2010/main" val="2692687474"/>
+      </p:ext>
+    </p:extLst>
+  </p:cSld>
+  <p:clrMapOvr>
+    <a:masterClrMapping/>
+  </p:clrMapOvr>
+</p:sld>
+</file>
+
+<file path=ppt/slides/slide15.xml><?xml version="1.0" encoding="utf-8"?>
+<p:sld xmlns:a="http://schemas.openxmlformats.org/drawingml/2006/main" xmlns:r="http://schemas.openxmlformats.org/officeDocument/2006/relationships" xmlns:p="http://schemas.openxmlformats.org/presentationml/2006/main">
+  <p:cSld>
+    <p:spTree>
+      <p:nvGrpSpPr>
+        <p:cNvPr id="1" name=""/>
+        <p:cNvGrpSpPr/>
+        <p:nvPr/>
+      </p:nvGrpSpPr>
+      <p:grpSpPr>
+        <a:xfrm>
+          <a:off x="0" y="0"/>
+          <a:ext cx="0" cy="0"/>
+          <a:chOff x="0" y="0"/>
+          <a:chExt cx="0" cy="0"/>
+        </a:xfrm>
+      </p:grpSpPr>
+      <p:sp>
+        <p:nvSpPr>
+          <p:cNvPr id="2" name="Title 1"/>
+          <p:cNvSpPr>
+            <a:spLocks noGrp="1"/>
+          </p:cNvSpPr>
+          <p:nvPr>
+            <p:ph type="title"/>
+          </p:nvPr>
+        </p:nvSpPr>
+        <p:spPr/>
+        <p:txBody>
+          <a:bodyPr/>
+          <a:lstStyle/>
+          <a:p>
+            <a:r>
+              <a:rPr lang="en-US" dirty="0" smtClean="0"/>
+              <a:t>References</a:t>
+            </a:r>
+            <a:endParaRPr lang="en-US" dirty="0"/>
+          </a:p>
+        </p:txBody>
+      </p:sp>
+      <p:sp>
+        <p:nvSpPr>
+          <p:cNvPr id="3" name="Content Placeholder 2"/>
+          <p:cNvSpPr>
+            <a:spLocks noGrp="1"/>
+          </p:cNvSpPr>
+          <p:nvPr>
+            <p:ph idx="1"/>
+          </p:nvPr>
+        </p:nvSpPr>
+        <p:spPr/>
+        <p:txBody>
+          <a:bodyPr>
+            <a:normAutofit fontScale="40000" lnSpcReduction="20000"/>
+          </a:bodyPr>
+          <a:lstStyle/>
+          <a:p>
+            <a:r>
+              <a:rPr lang="en-US" dirty="0" smtClean="0"/>
+              <a:t>Stephen </a:t>
+            </a:r>
+            <a:r>
+              <a:rPr lang="en-US" dirty="0"/>
+              <a:t>F. </a:t>
+            </a:r>
+            <a:r>
+              <a:rPr lang="en-US" dirty="0" err="1"/>
+              <a:t>Altschul</a:t>
+            </a:r>
+            <a:r>
+              <a:rPr lang="en-US" dirty="0"/>
+              <a:t>, Warren Gish, Webb Miller, Eugene W. Myers, and David J. </a:t>
+            </a:r>
+            <a:r>
+              <a:rPr lang="en-US" dirty="0" err="1"/>
+              <a:t>Lipman</a:t>
+            </a:r>
+            <a:r>
+              <a:rPr lang="en-US" dirty="0"/>
+              <a:t>. Basic local alignment search tool. </a:t>
+            </a:r>
+            <a:r>
+              <a:rPr lang="en-US" i="1" dirty="0"/>
+              <a:t>Journal of Molecular Biology</a:t>
+            </a:r>
+            <a:r>
+              <a:rPr lang="en-US" dirty="0"/>
+              <a:t>, 215(3):403 – 410, 1990.</a:t>
+            </a:r>
+          </a:p>
+          <a:p>
+            <a:r>
+              <a:rPr lang="en-US" dirty="0" smtClean="0"/>
+              <a:t>A</a:t>
+            </a:r>
+            <a:r>
+              <a:rPr lang="en-US" dirty="0"/>
+              <a:t>. </a:t>
+            </a:r>
+            <a:r>
+              <a:rPr lang="en-US" dirty="0" err="1"/>
+              <a:t>Biegert</a:t>
+            </a:r>
+            <a:r>
+              <a:rPr lang="en-US" dirty="0"/>
+              <a:t> and J. </a:t>
+            </a:r>
+            <a:r>
+              <a:rPr lang="en-US" dirty="0" err="1" smtClean="0"/>
+              <a:t>S</a:t>
+            </a:r>
+            <a:r>
+              <a:rPr lang="en-US" dirty="0" err="1" smtClean="0"/>
+              <a:t>ö</a:t>
+            </a:r>
+            <a:r>
+              <a:rPr lang="en-US" dirty="0" err="1" smtClean="0"/>
+              <a:t>ding</a:t>
+            </a:r>
+            <a:r>
+              <a:rPr lang="en-US" dirty="0"/>
+              <a:t>. Sequence context-specific profiles for homology searching. </a:t>
+            </a:r>
+            <a:r>
+              <a:rPr lang="en-US" i="1" dirty="0"/>
+              <a:t>Proceedings of the National Academy of Sciences</a:t>
+            </a:r>
+            <a:r>
+              <a:rPr lang="en-US" dirty="0"/>
+              <a:t>, 106(10):3770– 3775, 2009.</a:t>
+            </a:r>
+          </a:p>
+          <a:p>
+            <a:r>
+              <a:rPr lang="en-US" dirty="0" smtClean="0"/>
+              <a:t>R.C</a:t>
+            </a:r>
+            <a:r>
+              <a:rPr lang="en-US" dirty="0"/>
+              <a:t>. Edgar. Muscle: multiple sequence alignment with high accuracy and high throughput. </a:t>
+            </a:r>
+            <a:r>
+              <a:rPr lang="en-US" i="1" dirty="0"/>
+              <a:t>Nucleic acids research</a:t>
+            </a:r>
+            <a:r>
+              <a:rPr lang="en-US" dirty="0"/>
+              <a:t>, 32(5):1792–1797, 2004.</a:t>
+            </a:r>
+          </a:p>
+          <a:p>
+            <a:r>
+              <a:rPr lang="en-US" dirty="0" smtClean="0"/>
+              <a:t>Ralf </a:t>
+            </a:r>
+            <a:r>
+              <a:rPr lang="en-US" dirty="0" err="1"/>
+              <a:t>Flaig</a:t>
+            </a:r>
+            <a:r>
+              <a:rPr lang="en-US" dirty="0"/>
+              <a:t>, </a:t>
+            </a:r>
+            <a:r>
+              <a:rPr lang="en-US" dirty="0" err="1"/>
+              <a:t>Holger</a:t>
+            </a:r>
+            <a:r>
+              <a:rPr lang="en-US" dirty="0"/>
+              <a:t> </a:t>
+            </a:r>
+            <a:r>
+              <a:rPr lang="en-US" dirty="0" err="1"/>
+              <a:t>Greschik</a:t>
+            </a:r>
+            <a:r>
+              <a:rPr lang="en-US" dirty="0"/>
+              <a:t>, Carole </a:t>
+            </a:r>
+            <a:r>
+              <a:rPr lang="en-US" dirty="0" err="1"/>
+              <a:t>Peluso-Iltis</a:t>
+            </a:r>
+            <a:r>
+              <a:rPr lang="en-US" dirty="0"/>
+              <a:t>, and Dino </a:t>
+            </a:r>
+            <a:r>
+              <a:rPr lang="en-US" dirty="0" err="1"/>
+              <a:t>Moras</a:t>
+            </a:r>
+            <a:r>
+              <a:rPr lang="en-US" dirty="0"/>
+              <a:t>. </a:t>
+            </a:r>
+            <a:r>
+              <a:rPr lang="en-US" dirty="0" smtClean="0"/>
+              <a:t>Structural </a:t>
+            </a:r>
+            <a:r>
+              <a:rPr lang="en-US" dirty="0"/>
+              <a:t>basis for the cell-specific activities of the </a:t>
+            </a:r>
+            <a:r>
+              <a:rPr lang="en-US" dirty="0" err="1"/>
+              <a:t>ngfi</a:t>
+            </a:r>
+            <a:r>
+              <a:rPr lang="en-US" dirty="0"/>
+              <a:t>-b and the nurr1 ligand- binding domain. </a:t>
+            </a:r>
+            <a:r>
+              <a:rPr lang="en-US" i="1" dirty="0"/>
+              <a:t>Journal of Biological Chemistry</a:t>
+            </a:r>
+            <a:r>
+              <a:rPr lang="en-US" dirty="0"/>
+              <a:t>, 280(19):19250–19258, 2005.</a:t>
+            </a:r>
+          </a:p>
+          <a:p>
+            <a:r>
+              <a:rPr lang="en-US" dirty="0" err="1" smtClean="0"/>
+              <a:t>Andriy</a:t>
+            </a:r>
+            <a:r>
+              <a:rPr lang="en-US" dirty="0" smtClean="0"/>
+              <a:t> </a:t>
+            </a:r>
+            <a:r>
+              <a:rPr lang="en-US" dirty="0" err="1"/>
+              <a:t>Kryshtafovych</a:t>
+            </a:r>
+            <a:r>
+              <a:rPr lang="en-US" dirty="0"/>
+              <a:t> and Krzysztof Fidelis. Protein structure prediction and model quality assessment. </a:t>
+            </a:r>
+            <a:r>
+              <a:rPr lang="en-US" i="1" dirty="0"/>
+              <a:t>Drug Discovery Today</a:t>
+            </a:r>
+            <a:r>
+              <a:rPr lang="en-US" dirty="0"/>
+              <a:t>, 14(78):386 </a:t>
+            </a:r>
+            <a:r>
+              <a:rPr lang="en-US" dirty="0" smtClean="0"/>
+              <a:t>–393</a:t>
+            </a:r>
+            <a:r>
+              <a:rPr lang="en-US" dirty="0"/>
+              <a:t>, 2009.</a:t>
+            </a:r>
+          </a:p>
+          <a:p>
+            <a:r>
+              <a:rPr lang="en-US" dirty="0" smtClean="0"/>
+              <a:t>A</a:t>
+            </a:r>
+            <a:r>
+              <a:rPr lang="en-US" dirty="0"/>
+              <a:t>. </a:t>
+            </a:r>
+            <a:r>
+              <a:rPr lang="en-US" dirty="0" err="1"/>
+              <a:t>Sali</a:t>
+            </a:r>
+            <a:r>
+              <a:rPr lang="en-US" dirty="0"/>
+              <a:t> and TL Blundell. Comparative protein </a:t>
+            </a:r>
+            <a:r>
+              <a:rPr lang="en-US" dirty="0" err="1"/>
+              <a:t>modelling</a:t>
+            </a:r>
+            <a:r>
+              <a:rPr lang="en-US" dirty="0"/>
+              <a:t> by satisfaction of spatial restraints. </a:t>
+            </a:r>
+            <a:r>
+              <a:rPr lang="en-US" i="1" dirty="0"/>
+              <a:t>Protein Structure by Distance Analysis</a:t>
+            </a:r>
+            <a:r>
+              <a:rPr lang="en-US" dirty="0"/>
+              <a:t>, 64:C86, 1994.</a:t>
+            </a:r>
+          </a:p>
+          <a:p>
+            <a:r>
+              <a:rPr lang="en-US" dirty="0" smtClean="0"/>
+              <a:t>Andrej </a:t>
+            </a:r>
+            <a:r>
+              <a:rPr lang="en-US" dirty="0" err="1"/>
+              <a:t>Sali</a:t>
+            </a:r>
+            <a:r>
+              <a:rPr lang="en-US" dirty="0"/>
+              <a:t>, Liz </a:t>
+            </a:r>
+            <a:r>
+              <a:rPr lang="en-US" dirty="0" err="1"/>
+              <a:t>Potterton</a:t>
+            </a:r>
+            <a:r>
+              <a:rPr lang="en-US" dirty="0"/>
+              <a:t>, </a:t>
+            </a:r>
+            <a:r>
+              <a:rPr lang="en-US" dirty="0" err="1"/>
+              <a:t>Feng</a:t>
+            </a:r>
+            <a:r>
+              <a:rPr lang="en-US" dirty="0"/>
+              <a:t> Yuan, Herman van </a:t>
+            </a:r>
+            <a:r>
+              <a:rPr lang="en-US" dirty="0" err="1"/>
+              <a:t>Vlijmen</a:t>
+            </a:r>
+            <a:r>
+              <a:rPr lang="en-US" dirty="0"/>
+              <a:t>, and Martin </a:t>
+            </a:r>
+            <a:r>
+              <a:rPr lang="en-US" dirty="0" err="1"/>
+              <a:t>Karplus</a:t>
+            </a:r>
+            <a:r>
+              <a:rPr lang="en-US" dirty="0"/>
+              <a:t>. Evaluation of comparative protein modeling by </a:t>
+            </a:r>
+            <a:r>
+              <a:rPr lang="en-US" dirty="0" err="1"/>
+              <a:t>modeller</a:t>
+            </a:r>
+            <a:r>
+              <a:rPr lang="en-US" dirty="0"/>
+              <a:t>. </a:t>
+            </a:r>
+            <a:r>
+              <a:rPr lang="en-US" i="1" dirty="0" smtClean="0"/>
+              <a:t>Proteins</a:t>
+            </a:r>
+            <a:r>
+              <a:rPr lang="en-US" i="1" dirty="0"/>
+              <a:t>: Structure, Function, and Bioinformatics</a:t>
+            </a:r>
+            <a:r>
+              <a:rPr lang="en-US" dirty="0"/>
+              <a:t>, 23(3):318–326, 1995.</a:t>
+            </a:r>
+          </a:p>
+          <a:p>
+            <a:r>
+              <a:rPr lang="en-US" dirty="0" smtClean="0"/>
+              <a:t>Schr</a:t>
+            </a:r>
+            <a:r>
+              <a:rPr lang="en-US" dirty="0" smtClean="0"/>
+              <a:t>ö</a:t>
+            </a:r>
+            <a:r>
+              <a:rPr lang="en-US" dirty="0" smtClean="0"/>
+              <a:t>dinger, LLC</a:t>
+            </a:r>
+            <a:r>
+              <a:rPr lang="en-US" dirty="0"/>
+              <a:t>. </a:t>
+            </a:r>
+            <a:r>
+              <a:rPr lang="en-US" dirty="0" smtClean="0"/>
+              <a:t>The </a:t>
+            </a:r>
+            <a:r>
+              <a:rPr lang="en-US" dirty="0" err="1" smtClean="0"/>
+              <a:t>PyMOL</a:t>
+            </a:r>
+            <a:r>
+              <a:rPr lang="en-US" dirty="0" smtClean="0"/>
+              <a:t> Molecular Graphics System, Version </a:t>
+            </a:r>
+            <a:r>
+              <a:rPr lang="en-US" dirty="0"/>
+              <a:t>1.2r3pre.</a:t>
+            </a:r>
+          </a:p>
+          <a:p>
+            <a:r>
+              <a:rPr lang="en-US" dirty="0" smtClean="0"/>
+              <a:t>Min</a:t>
+            </a:r>
+            <a:r>
+              <a:rPr lang="en-US" dirty="0"/>
+              <a:t>-</a:t>
+            </a:r>
+            <a:r>
+              <a:rPr lang="en-US" dirty="0" err="1"/>
+              <a:t>yi</a:t>
+            </a:r>
+            <a:r>
+              <a:rPr lang="en-US" dirty="0"/>
+              <a:t> </a:t>
+            </a:r>
+            <a:r>
+              <a:rPr lang="en-US" dirty="0" err="1"/>
+              <a:t>Shen</a:t>
+            </a:r>
+            <a:r>
+              <a:rPr lang="en-US" dirty="0"/>
+              <a:t> and Andrej </a:t>
+            </a:r>
+            <a:r>
+              <a:rPr lang="en-US" dirty="0" err="1"/>
+              <a:t>Sali</a:t>
+            </a:r>
+            <a:r>
+              <a:rPr lang="en-US" dirty="0"/>
+              <a:t>. Statistical potential for assessment and </a:t>
+            </a:r>
+            <a:r>
+              <a:rPr lang="en-US" dirty="0" smtClean="0"/>
+              <a:t>prediction </a:t>
+            </a:r>
+            <a:r>
+              <a:rPr lang="en-US" dirty="0"/>
+              <a:t>of protein structures. </a:t>
+            </a:r>
+            <a:r>
+              <a:rPr lang="en-US" i="1" dirty="0"/>
+              <a:t>Protein Science</a:t>
+            </a:r>
+            <a:r>
+              <a:rPr lang="en-US" dirty="0"/>
+              <a:t>, 15(11):2507–2524, 2006.</a:t>
+            </a:r>
+          </a:p>
+          <a:p>
+            <a:r>
+              <a:rPr lang="en-US" dirty="0" smtClean="0"/>
+              <a:t>Y</a:t>
+            </a:r>
+            <a:r>
+              <a:rPr lang="en-US" dirty="0"/>
+              <a:t>. Zhang and J. Skolnick. The protein structure prediction problem could be solved using the current </a:t>
+            </a:r>
+            <a:r>
+              <a:rPr lang="en-US" dirty="0" err="1"/>
+              <a:t>pdb</a:t>
+            </a:r>
+            <a:r>
+              <a:rPr lang="en-US" dirty="0"/>
+              <a:t> library. </a:t>
+            </a:r>
+            <a:r>
+              <a:rPr lang="en-US" i="1" dirty="0"/>
+              <a:t>Proceedings of the National Academy of Sciences of the United States of America</a:t>
+            </a:r>
+            <a:r>
+              <a:rPr lang="en-US" dirty="0"/>
+              <a:t>, 102(4):1029, 2005.</a:t>
+            </a:r>
+          </a:p>
+        </p:txBody>
+      </p:sp>
+    </p:spTree>
+    <p:extLst>
+      <p:ext uri="{BB962C8B-B14F-4D97-AF65-F5344CB8AC3E}">
+        <p14:creationId xmlns:p14="http://schemas.microsoft.com/office/powerpoint/2010/main" val="1628988875"/>
+      </p:ext>
+    </p:extLst>
+  </p:cSld>
+  <p:clrMapOvr>
+    <a:masterClrMapping/>
+  </p:clrMapOvr>
+  <p:timing>
+    <p:tnLst>
+      <p:par>
+        <p:cTn xmlns:p14="http://schemas.microsoft.com/office/powerpoint/2010/main" id="1" dur="indefinite" restart="never" nodeType="tmRoot"/>
+      </p:par>
+    </p:tnLst>
+  </p:timing>
 </p:sld>
 </file>
 
@@ -3253,22 +4433,38 @@
         <p:spPr/>
         <p:txBody>
           <a:bodyPr>
-            <a:normAutofit lnSpcReduction="10000"/>
+            <a:normAutofit fontScale="92500" lnSpcReduction="20000"/>
           </a:bodyPr>
           <a:lstStyle/>
           <a:p>
             <a:r>
               <a:rPr lang="en-US" dirty="0" smtClean="0"/>
-              <a:t>The Goal: Predict the structure of 1yje:A using homology modeling</a:t>
-            </a:r>
-          </a:p>
-          <a:p>
-            <a:r>
-              <a:rPr lang="en-US" dirty="0" smtClean="0"/>
-              <a:t>What is homology modeling?</a:t>
-            </a:r>
-          </a:p>
-          <a:p>
+              <a:t>Goal</a:t>
+            </a:r>
+            <a:r>
+              <a:rPr lang="en-US" dirty="0" smtClean="0"/>
+              <a:t>: Predict the structure of 1yje:A using homology modeling</a:t>
+            </a:r>
+          </a:p>
+          <a:p>
+            <a:r>
+              <a:rPr lang="en-US" dirty="0" smtClean="0"/>
+              <a:t>Introduction: </a:t>
+            </a:r>
+          </a:p>
+          <a:p>
+            <a:pPr lvl="1"/>
+            <a:r>
+              <a:rPr lang="en-US" dirty="0" smtClean="0"/>
+              <a:t>What </a:t>
+            </a:r>
+            <a:r>
+              <a:rPr lang="en-US" dirty="0" smtClean="0"/>
+              <a:t>is homology modeling?</a:t>
+            </a:r>
+          </a:p>
+          <a:p>
+            <a:pPr lvl="1"/>
             <a:r>
               <a:rPr lang="en-US" dirty="0" smtClean="0"/>
               <a:t>What is </a:t>
@@ -3285,16 +4481,9 @@
           <a:p>
             <a:r>
               <a:rPr lang="en-US" dirty="0" smtClean="0"/>
-              <a:t>Using </a:t>
-            </a:r>
-            <a:r>
-              <a:rPr lang="en-US" dirty="0" err="1" smtClean="0"/>
-              <a:t>Modeller</a:t>
-            </a:r>
-            <a:r>
-              <a:rPr lang="en-US" dirty="0" smtClean="0"/>
-              <a:t>:</a:t>
-            </a:r>
+              <a:t>Methods:</a:t>
+            </a:r>
+            <a:endParaRPr lang="en-US" dirty="0" smtClean="0"/>
           </a:p>
           <a:p>
             <a:pPr lvl="1"/>
@@ -3318,10 +4507,9 @@
             </a:r>
           </a:p>
           <a:p>
-            <a:pPr lvl="1"/>
-            <a:r>
-              <a:rPr lang="en-US" dirty="0" smtClean="0"/>
-              <a:t>Evaluation of prediction quality</a:t>
+            <a:r>
+              <a:rPr lang="en-US" dirty="0" smtClean="0"/>
+              <a:t>Results: Predicted structures and conclusions</a:t>
             </a:r>
             <a:endParaRPr lang="en-US" dirty="0"/>
           </a:p>
@@ -3337,6 +4525,13 @@
   <p:clrMapOvr>
     <a:masterClrMapping/>
   </p:clrMapOvr>
+  <p:timing>
+    <p:tnLst>
+      <p:par>
+        <p:cTn xmlns:p14="http://schemas.microsoft.com/office/powerpoint/2010/main" id="1" dur="indefinite" restart="never" nodeType="tmRoot"/>
+      </p:par>
+    </p:tnLst>
+  </p:timing>
 </p:sld>
 </file>
 
@@ -3369,16 +4564,14 @@
         </p:nvSpPr>
         <p:spPr/>
         <p:txBody>
-          <a:bodyPr/>
-          <a:lstStyle/>
-          <a:p>
-            <a:r>
-              <a:rPr lang="en-US" dirty="0" smtClean="0"/>
-              <a:t>Homology </a:t>
-            </a:r>
-            <a:r>
-              <a:rPr lang="en-US" dirty="0" err="1" smtClean="0"/>
-              <a:t>modelling</a:t>
+          <a:bodyPr>
+            <a:normAutofit/>
+          </a:bodyPr>
+          <a:lstStyle/>
+          <a:p>
+            <a:r>
+              <a:rPr lang="en-US" dirty="0" smtClean="0"/>
+              <a:t>Introduction: Homology modeling</a:t>
             </a:r>
             <a:endParaRPr lang="en-US" dirty="0"/>
           </a:p>
@@ -3397,7 +4590,7 @@
         <p:spPr/>
         <p:txBody>
           <a:bodyPr>
-            <a:normAutofit lnSpcReduction="10000"/>
+            <a:normAutofit/>
           </a:bodyPr>
           <a:lstStyle/>
           <a:p>
@@ -3422,33 +4615,103 @@
           </a:p>
           <a:p>
             <a:r>
-              <a:rPr lang="en-US" dirty="0" err="1" smtClean="0"/>
-              <a:t>Modeller</a:t>
-            </a:r>
-            <a:r>
-              <a:rPr lang="en-US" dirty="0" smtClean="0"/>
-              <a:t> predicts structures by “satisfaction of spatial restraints”</a:t>
-            </a:r>
-          </a:p>
-        </p:txBody>
-      </p:sp>
-      <p:sp>
-        <p:nvSpPr>
-          <p:cNvPr id="5" name="Content Placeholder 4"/>
-          <p:cNvSpPr>
-            <a:spLocks noGrp="1"/>
-          </p:cNvSpPr>
-          <p:nvPr>
-            <p:ph sz="half" idx="2"/>
-          </p:nvPr>
-        </p:nvSpPr>
-        <p:spPr/>
-        <p:txBody>
-          <a:bodyPr>
-            <a:normAutofit lnSpcReduction="10000"/>
-          </a:bodyPr>
-          <a:lstStyle/>
-          <a:p>
+              <a:rPr lang="en-US" dirty="0" smtClean="0"/>
+              <a:t>Structure is </a:t>
+            </a:r>
+            <a:r>
+              <a:rPr lang="en-US" i="1" dirty="0" smtClean="0"/>
+              <a:t>much</a:t>
+            </a:r>
+            <a:r>
+              <a:rPr lang="en-US" dirty="0" smtClean="0"/>
+              <a:t> more conserved than sequence</a:t>
+            </a:r>
+            <a:endParaRPr lang="en-US" dirty="0" smtClean="0"/>
+          </a:p>
+        </p:txBody>
+      </p:sp>
+      <p:pic>
+        <p:nvPicPr>
+          <p:cNvPr id="6" name="Picture 5"/>
+          <p:cNvPicPr>
+            <a:picLocks noChangeAspect="1"/>
+          </p:cNvPicPr>
+          <p:nvPr/>
+        </p:nvPicPr>
+        <p:blipFill>
+          <a:blip r:embed="rId2"/>
+          <a:stretch>
+            <a:fillRect/>
+          </a:stretch>
+        </p:blipFill>
+        <p:spPr>
+          <a:xfrm>
+            <a:off x="4495800" y="1600200"/>
+            <a:ext cx="4191000" cy="1766529"/>
+          </a:xfrm>
+          <a:prstGeom prst="rect">
+            <a:avLst/>
+          </a:prstGeom>
+        </p:spPr>
+      </p:pic>
+      <p:pic>
+        <p:nvPicPr>
+          <p:cNvPr id="7" name="Picture 6"/>
+          <p:cNvPicPr>
+            <a:picLocks noChangeAspect="1"/>
+          </p:cNvPicPr>
+          <p:nvPr/>
+        </p:nvPicPr>
+        <p:blipFill>
+          <a:blip r:embed="rId3"/>
+          <a:stretch>
+            <a:fillRect/>
+          </a:stretch>
+        </p:blipFill>
+        <p:spPr>
+          <a:xfrm>
+            <a:off x="4841297" y="3791453"/>
+            <a:ext cx="3497898" cy="2953263"/>
+          </a:xfrm>
+          <a:prstGeom prst="rect">
+            <a:avLst/>
+          </a:prstGeom>
+        </p:spPr>
+      </p:pic>
+      <p:sp>
+        <p:nvSpPr>
+          <p:cNvPr id="8" name="Down Arrow 7"/>
+          <p:cNvSpPr/>
+          <p:nvPr/>
+        </p:nvSpPr>
+        <p:spPr>
+          <a:xfrm>
+            <a:off x="5761397" y="3366729"/>
+            <a:ext cx="1652783" cy="424724"/>
+          </a:xfrm>
+          <a:prstGeom prst="downArrow">
+            <a:avLst/>
+          </a:prstGeom>
+        </p:spPr>
+        <p:style>
+          <a:lnRef idx="1">
+            <a:schemeClr val="accent1"/>
+          </a:lnRef>
+          <a:fillRef idx="3">
+            <a:schemeClr val="accent1"/>
+          </a:fillRef>
+          <a:effectRef idx="2">
+            <a:schemeClr val="accent1"/>
+          </a:effectRef>
+          <a:fontRef idx="minor">
+            <a:schemeClr val="lt1"/>
+          </a:fontRef>
+        </p:style>
+        <p:txBody>
+          <a:bodyPr rtlCol="0" anchor="ctr"/>
+          <a:lstStyle/>
+          <a:p>
+            <a:pPr algn="ctr"/>
             <a:endParaRPr lang="en-US"/>
           </a:p>
         </p:txBody>
@@ -3463,6 +4726,13 @@
   <p:clrMapOvr>
     <a:masterClrMapping/>
   </p:clrMapOvr>
+  <p:timing>
+    <p:tnLst>
+      <p:par>
+        <p:cTn xmlns:p14="http://schemas.microsoft.com/office/powerpoint/2010/main" id="1" dur="indefinite" restart="never" nodeType="tmRoot"/>
+      </p:par>
+    </p:tnLst>
+  </p:timing>
 </p:sld>
 </file>
 
@@ -3499,6 +4769,10 @@
           <a:lstStyle/>
           <a:p>
             <a:r>
+              <a:rPr lang="en-US" dirty="0" smtClean="0"/>
+              <a:t>Introduction: </a:t>
+            </a:r>
+            <a:r>
               <a:rPr lang="en-US" dirty="0" err="1" smtClean="0"/>
               <a:t>Modeller</a:t>
             </a:r>
@@ -3516,31 +4790,92 @@
             <p:ph sz="half" idx="1"/>
           </p:nvPr>
         </p:nvSpPr>
-        <p:spPr/>
-        <p:txBody>
-          <a:bodyPr/>
-          <a:lstStyle/>
-          <a:p>
-            <a:endParaRPr lang="en-US"/>
-          </a:p>
-        </p:txBody>
-      </p:sp>
-      <p:sp>
-        <p:nvSpPr>
-          <p:cNvPr id="4" name="Content Placeholder 3"/>
-          <p:cNvSpPr>
-            <a:spLocks noGrp="1"/>
-          </p:cNvSpPr>
-          <p:nvPr>
-            <p:ph sz="half" idx="2"/>
-          </p:nvPr>
-        </p:nvSpPr>
-        <p:spPr/>
-        <p:txBody>
-          <a:bodyPr/>
-          <a:lstStyle/>
-          <a:p>
-            <a:endParaRPr lang="en-US"/>
+        <p:spPr>
+          <a:xfrm>
+            <a:off x="457200" y="1600200"/>
+            <a:ext cx="8229600" cy="4525963"/>
+          </a:xfrm>
+        </p:spPr>
+        <p:txBody>
+          <a:bodyPr>
+            <a:normAutofit lnSpcReduction="10000"/>
+          </a:bodyPr>
+          <a:lstStyle/>
+          <a:p>
+            <a:r>
+              <a:rPr lang="en-US" dirty="0" smtClean="0"/>
+              <a:t>Free Python package due to </a:t>
+            </a:r>
+            <a:r>
+              <a:rPr lang="en-US" dirty="0" err="1" smtClean="0"/>
+              <a:t>Sali</a:t>
+            </a:r>
+            <a:r>
+              <a:rPr lang="en-US" dirty="0" smtClean="0"/>
+              <a:t> et al. (1994)</a:t>
+            </a:r>
+          </a:p>
+          <a:p>
+            <a:r>
+              <a:rPr lang="en-US" dirty="0" smtClean="0"/>
+              <a:t>No GUI–knowledge of Python required</a:t>
+            </a:r>
+          </a:p>
+          <a:p>
+            <a:r>
+              <a:rPr lang="en-US" dirty="0" smtClean="0"/>
+              <a:t>Predicts structures by “satisfaction of spatial restraints”</a:t>
+            </a:r>
+          </a:p>
+          <a:p>
+            <a:pPr lvl="1"/>
+            <a:r>
+              <a:rPr lang="en-US" dirty="0" smtClean="0"/>
+              <a:t>Spatial features common to template structures are </a:t>
+            </a:r>
+            <a:r>
+              <a:rPr lang="en-US" dirty="0" err="1" smtClean="0"/>
+              <a:t>globbed</a:t>
+            </a:r>
+            <a:endParaRPr lang="en-US" dirty="0" smtClean="0"/>
+          </a:p>
+          <a:p>
+            <a:pPr lvl="1"/>
+            <a:r>
+              <a:rPr lang="en-US" dirty="0" smtClean="0"/>
+              <a:t>Energy or probability functions are assigned to each spatial feature, imposing restraints</a:t>
+            </a:r>
+          </a:p>
+          <a:p>
+            <a:pPr lvl="1"/>
+            <a:r>
+              <a:rPr lang="en-US" dirty="0" smtClean="0"/>
+              <a:t>The model that best satisfies these restrains is selected</a:t>
+            </a:r>
+          </a:p>
+          <a:p>
+            <a:pPr lvl="1"/>
+            <a:r>
+              <a:rPr lang="en-US" dirty="0" smtClean="0"/>
+              <a:t>Examples: molecular PDF, GA341, DOPE (</a:t>
+            </a:r>
+            <a:r>
+              <a:rPr lang="en-US" dirty="0" err="1" smtClean="0"/>
+              <a:t>Shen</a:t>
+            </a:r>
+            <a:r>
+              <a:rPr lang="en-US" dirty="0" smtClean="0"/>
+              <a:t> and </a:t>
+            </a:r>
+            <a:r>
+              <a:rPr lang="en-US" dirty="0" err="1" smtClean="0"/>
+              <a:t>Sali</a:t>
+            </a:r>
+            <a:r>
+              <a:rPr lang="en-US" dirty="0" smtClean="0"/>
+              <a:t> 2006)</a:t>
+            </a:r>
+            <a:endParaRPr lang="en-US" dirty="0"/>
           </a:p>
         </p:txBody>
       </p:sp>
@@ -3554,6 +4889,13 @@
   <p:clrMapOvr>
     <a:masterClrMapping/>
   </p:clrMapOvr>
+  <p:timing>
+    <p:tnLst>
+      <p:par>
+        <p:cTn xmlns:p14="http://schemas.microsoft.com/office/powerpoint/2010/main" id="1" dur="indefinite" restart="never" nodeType="tmRoot"/>
+      </p:par>
+    </p:tnLst>
+  </p:timing>
 </p:sld>
 </file>
 
@@ -3591,7 +4933,11 @@
           <a:p>
             <a:r>
               <a:rPr lang="en-US" dirty="0" smtClean="0"/>
-              <a:t>Initial search</a:t>
+              <a:t>Methods: Initial </a:t>
+            </a:r>
+            <a:r>
+              <a:rPr lang="en-US" dirty="0" smtClean="0"/>
+              <a:t>search</a:t>
             </a:r>
             <a:endParaRPr lang="en-US" dirty="0"/>
           </a:p>
@@ -3609,7 +4955,9 @@
         </p:nvSpPr>
         <p:spPr/>
         <p:txBody>
-          <a:bodyPr/>
+          <a:bodyPr>
+            <a:normAutofit fontScale="92500" lnSpcReduction="10000"/>
+          </a:bodyPr>
           <a:lstStyle/>
           <a:p>
             <a:r>
@@ -3622,21 +4970,45 @@
             </a:r>
             <a:r>
               <a:rPr lang="en-US" dirty="0" smtClean="0"/>
-              <a:t> against the non-redundant (look at what this means; identity cutoff?) PDB (what is </a:t>
+              <a:t> against the non-redundant </a:t>
+            </a:r>
+            <a:r>
+              <a:rPr lang="en-US" dirty="0" smtClean="0"/>
+              <a:t>PDB</a:t>
+            </a:r>
+          </a:p>
+          <a:p>
+            <a:pPr lvl="1"/>
+            <a:r>
+              <a:rPr lang="en-US" dirty="0" smtClean="0"/>
+              <a:t>CSBLAST looks for matches by considering the </a:t>
+            </a:r>
+            <a:r>
+              <a:rPr lang="en-US" i="1" dirty="0" smtClean="0"/>
+              <a:t>context</a:t>
+            </a:r>
+            <a:r>
+              <a:rPr lang="en-US" dirty="0" smtClean="0"/>
+              <a:t> around amino acids (</a:t>
             </a:r>
             <a:r>
               <a:rPr lang="en-US" dirty="0" err="1" smtClean="0"/>
-              <a:t>CSBlast</a:t>
-            </a:r>
-            <a:r>
-              <a:rPr lang="en-US" dirty="0" smtClean="0"/>
-              <a:t>?)</a:t>
-            </a:r>
-          </a:p>
-          <a:p>
-            <a:r>
-              <a:rPr lang="en-US" dirty="0" smtClean="0"/>
-              <a:t>Hits with </a:t>
+              <a:t>Biegert</a:t>
+            </a:r>
+            <a:r>
+              <a:rPr lang="en-US" dirty="0" smtClean="0"/>
+              <a:t> et al. 2009)</a:t>
+            </a:r>
+            <a:endParaRPr lang="en-US" dirty="0"/>
+          </a:p>
+          <a:p>
+            <a:r>
+              <a:rPr lang="en-US" dirty="0" smtClean="0"/>
+              <a:t>Hits </a:t>
+            </a:r>
+            <a:r>
+              <a:rPr lang="en-US" dirty="0" smtClean="0"/>
+              <a:t>with </a:t>
             </a:r>
             <a:r>
               <a:rPr lang="en-US" i="1" dirty="0" smtClean="0"/>
@@ -3665,8 +5037,13 @@
           <a:p>
             <a:r>
               <a:rPr lang="en-US" dirty="0" smtClean="0"/>
-              <a:t>An initial MSA was generated using MUSCLE</a:t>
-            </a:r>
+              <a:t>An initial MSA was generated using </a:t>
+            </a:r>
+            <a:r>
+              <a:rPr lang="en-US" dirty="0" smtClean="0"/>
+              <a:t>MUSCLE (Edgar 2004)</a:t>
+            </a:r>
+            <a:endParaRPr lang="en-US" dirty="0" smtClean="0"/>
           </a:p>
         </p:txBody>
       </p:sp>
@@ -3680,6 +5057,13 @@
   <p:clrMapOvr>
     <a:masterClrMapping/>
   </p:clrMapOvr>
+  <p:timing>
+    <p:tnLst>
+      <p:par>
+        <p:cTn xmlns:p14="http://schemas.microsoft.com/office/powerpoint/2010/main" id="1" dur="indefinite" restart="never" nodeType="tmRoot"/>
+      </p:par>
+    </p:tnLst>
+  </p:timing>
 </p:sld>
 </file>
 
@@ -3717,7 +5101,7 @@
           <a:p>
             <a:r>
               <a:rPr lang="en-US" dirty="0" smtClean="0"/>
-              <a:t>Alignment</a:t>
+              <a:t>Methods: Alignment</a:t>
             </a:r>
             <a:endParaRPr lang="en-US" dirty="0"/>
           </a:p>
@@ -3733,9 +5117,16 @@
             <p:ph idx="1"/>
           </p:nvPr>
         </p:nvSpPr>
-        <p:spPr/>
-        <p:txBody>
-          <a:bodyPr/>
+        <p:spPr>
+          <a:xfrm>
+            <a:off x="457200" y="1600200"/>
+            <a:ext cx="4118302" cy="4525963"/>
+          </a:xfrm>
+        </p:spPr>
+        <p:txBody>
+          <a:bodyPr>
+            <a:normAutofit fontScale="92500" lnSpcReduction="20000"/>
+          </a:bodyPr>
           <a:lstStyle/>
           <a:p>
             <a:r>
@@ -3759,8 +5150,13 @@
             </a:r>
             <a:r>
               <a:rPr lang="en-US" dirty="0" smtClean="0"/>
-              <a:t> file</a:t>
-            </a:r>
+              <a:t> </a:t>
+            </a:r>
+            <a:r>
+              <a:rPr lang="en-US" dirty="0" smtClean="0"/>
+              <a:t>files</a:t>
+            </a:r>
+            <a:endParaRPr lang="en-US" dirty="0" smtClean="0"/>
           </a:p>
           <a:p>
             <a:pPr lvl="1"/>
@@ -3786,6 +5182,30 @@
           </a:p>
         </p:txBody>
       </p:sp>
+      <p:pic>
+        <p:nvPicPr>
+          <p:cNvPr id="5" name="Picture 4"/>
+          <p:cNvPicPr>
+            <a:picLocks noChangeAspect="1"/>
+          </p:cNvPicPr>
+          <p:nvPr/>
+        </p:nvPicPr>
+        <p:blipFill>
+          <a:blip r:embed="rId2"/>
+          <a:stretch>
+            <a:fillRect/>
+          </a:stretch>
+        </p:blipFill>
+        <p:spPr>
+          <a:xfrm>
+            <a:off x="4575502" y="2309930"/>
+            <a:ext cx="4342546" cy="3108636"/>
+          </a:xfrm>
+          <a:prstGeom prst="rect">
+            <a:avLst/>
+          </a:prstGeom>
+        </p:spPr>
+      </p:pic>
     </p:spTree>
     <p:extLst>
       <p:ext uri="{BB962C8B-B14F-4D97-AF65-F5344CB8AC3E}">
@@ -3796,6 +5216,13 @@
   <p:clrMapOvr>
     <a:masterClrMapping/>
   </p:clrMapOvr>
+  <p:timing>
+    <p:tnLst>
+      <p:par>
+        <p:cTn xmlns:p14="http://schemas.microsoft.com/office/powerpoint/2010/main" id="1" dur="indefinite" restart="never" nodeType="tmRoot"/>
+      </p:par>
+    </p:tnLst>
+  </p:timing>
 </p:sld>
 </file>
 
@@ -3828,12 +5255,18 @@
         </p:nvSpPr>
         <p:spPr/>
         <p:txBody>
-          <a:bodyPr/>
-          <a:lstStyle/>
-          <a:p>
-            <a:r>
-              <a:rPr lang="en-US" dirty="0" smtClean="0"/>
-              <a:t>Structure prediction</a:t>
+          <a:bodyPr>
+            <a:normAutofit/>
+          </a:bodyPr>
+          <a:lstStyle/>
+          <a:p>
+            <a:r>
+              <a:rPr lang="en-US" dirty="0" smtClean="0"/>
+              <a:t>Methods: Structure </a:t>
+            </a:r>
+            <a:r>
+              <a:rPr lang="en-US" dirty="0" smtClean="0"/>
+              <a:t>prediction</a:t>
             </a:r>
             <a:endParaRPr lang="en-US" dirty="0"/>
           </a:p>
@@ -3849,15 +5282,27 @@
             <p:ph idx="1"/>
           </p:nvPr>
         </p:nvSpPr>
-        <p:spPr/>
-        <p:txBody>
-          <a:bodyPr/>
-          <a:lstStyle/>
-          <a:p>
-            <a:r>
-              <a:rPr lang="en-US" dirty="0" smtClean="0"/>
-              <a:t>MSA was used to predict the structure of 1yje</a:t>
-            </a:r>
+        <p:spPr>
+          <a:xfrm>
+            <a:off x="457200" y="1600200"/>
+            <a:ext cx="4118302" cy="4525963"/>
+          </a:xfrm>
+        </p:spPr>
+        <p:txBody>
+          <a:bodyPr>
+            <a:normAutofit lnSpcReduction="10000"/>
+          </a:bodyPr>
+          <a:lstStyle/>
+          <a:p>
+            <a:r>
+              <a:rPr lang="en-US" dirty="0" smtClean="0"/>
+              <a:t>MSA was used to predict the structure of </a:t>
+            </a:r>
+            <a:r>
+              <a:rPr lang="en-US" dirty="0" smtClean="0"/>
+              <a:t>1yje:A</a:t>
+            </a:r>
+            <a:endParaRPr lang="en-US" dirty="0" smtClean="0"/>
           </a:p>
           <a:p>
             <a:pPr lvl="1"/>
@@ -3878,39 +5323,86 @@
             <a:pPr lvl="1"/>
             <a:r>
               <a:rPr lang="en-US" dirty="0" smtClean="0"/>
-              <a:t>More powerful tools available: can also model loops, </a:t>
+              <a:t>More powerful tools </a:t>
+            </a:r>
+            <a:r>
+              <a:rPr lang="en-US" dirty="0" smtClean="0"/>
+              <a:t>available</a:t>
+            </a:r>
+          </a:p>
+          <a:p>
+            <a:pPr lvl="1"/>
+            <a:r>
+              <a:rPr lang="en-US" dirty="0" smtClean="0"/>
+              <a:t>Select best of three models</a:t>
+            </a:r>
+          </a:p>
+          <a:p>
+            <a:pPr lvl="1"/>
+            <a:r>
+              <a:rPr lang="en-US" dirty="0" smtClean="0"/>
+              <a:t>Output: .</a:t>
             </a:r>
             <a:r>
               <a:rPr lang="en-US" dirty="0" err="1" smtClean="0"/>
-              <a:t>hydrogens</a:t>
-            </a:r>
-            <a:r>
-              <a:rPr lang="en-US" dirty="0" smtClean="0"/>
-              <a:t>, etc., scoring functions</a:t>
-            </a:r>
-          </a:p>
-          <a:p>
-            <a:pPr lvl="1"/>
-            <a:r>
-              <a:rPr lang="en-US" dirty="0" smtClean="0"/>
-              <a:t>Not necessary for our purposes</a:t>
-            </a:r>
-          </a:p>
-          <a:p>
-            <a:r>
-              <a:rPr lang="en-US" dirty="0" smtClean="0"/>
-              <a:t>(Here we should have a few pictures)</a:t>
-            </a:r>
-          </a:p>
-          <a:p>
-            <a:r>
-              <a:rPr lang="en-US" dirty="0" smtClean="0"/>
-              <a:t>(screenshot of source code)</a:t>
+              <a:t>pdb</a:t>
+            </a:r>
+            <a:r>
+              <a:rPr lang="en-US" dirty="0" smtClean="0"/>
+              <a:t> file</a:t>
             </a:r>
             <a:endParaRPr lang="en-US" dirty="0"/>
           </a:p>
         </p:txBody>
       </p:sp>
+      <p:pic>
+        <p:nvPicPr>
+          <p:cNvPr id="4" name="Picture 3"/>
+          <p:cNvPicPr>
+            <a:picLocks noChangeAspect="1"/>
+          </p:cNvPicPr>
+          <p:nvPr/>
+        </p:nvPicPr>
+        <p:blipFill>
+          <a:blip r:embed="rId2"/>
+          <a:stretch>
+            <a:fillRect/>
+          </a:stretch>
+        </p:blipFill>
+        <p:spPr>
+          <a:xfrm>
+            <a:off x="4575502" y="1790700"/>
+            <a:ext cx="4230339" cy="1828187"/>
+          </a:xfrm>
+          <a:prstGeom prst="rect">
+            <a:avLst/>
+          </a:prstGeom>
+        </p:spPr>
+      </p:pic>
+      <p:pic>
+        <p:nvPicPr>
+          <p:cNvPr id="5" name="Picture 4"/>
+          <p:cNvPicPr>
+            <a:picLocks noChangeAspect="1"/>
+          </p:cNvPicPr>
+          <p:nvPr/>
+        </p:nvPicPr>
+        <p:blipFill>
+          <a:blip r:embed="rId3"/>
+          <a:stretch>
+            <a:fillRect/>
+          </a:stretch>
+        </p:blipFill>
+        <p:spPr>
+          <a:xfrm>
+            <a:off x="4575502" y="3870059"/>
+            <a:ext cx="4111298" cy="1441356"/>
+          </a:xfrm>
+          <a:prstGeom prst="rect">
+            <a:avLst/>
+          </a:prstGeom>
+        </p:spPr>
+      </p:pic>
     </p:spTree>
     <p:extLst>
       <p:ext uri="{BB962C8B-B14F-4D97-AF65-F5344CB8AC3E}">
@@ -3921,6 +5413,13 @@
   <p:clrMapOvr>
     <a:masterClrMapping/>
   </p:clrMapOvr>
+  <p:timing>
+    <p:tnLst>
+      <p:par>
+        <p:cTn xmlns:p14="http://schemas.microsoft.com/office/powerpoint/2010/main" id="1" dur="indefinite" restart="never" nodeType="tmRoot"/>
+      </p:par>
+    </p:tnLst>
+  </p:timing>
 </p:sld>
 </file>
 
@@ -3981,37 +5480,79 @@
           <a:p>
             <a:r>
               <a:rPr lang="en-US" dirty="0" smtClean="0"/>
-              <a:t>…can be performed using some quantitative measures (look at </a:t>
+              <a:t>…can be performed using some quantitative measures </a:t>
+            </a:r>
+            <a:endParaRPr lang="en-US" dirty="0" smtClean="0"/>
+          </a:p>
+          <a:p>
+            <a:pPr lvl="1"/>
+            <a:r>
+              <a:rPr lang="en-US" dirty="0" smtClean="0"/>
+              <a:t>Assessments like </a:t>
             </a:r>
             <a:r>
               <a:rPr lang="en-US" dirty="0" err="1" smtClean="0"/>
-              <a:t>Kryshtafovych</a:t>
-            </a:r>
-            <a:r>
-              <a:rPr lang="en-US" dirty="0" smtClean="0"/>
-              <a:t> et al.) (give numbers) (multiple models, select best one)</a:t>
-            </a:r>
-          </a:p>
-          <a:p>
-            <a:r>
-              <a:rPr lang="en-US" dirty="0" smtClean="0"/>
-              <a:t>…can be done visually in </a:t>
+              <a:t>Krystafovych</a:t>
+            </a:r>
+            <a:r>
+              <a:rPr lang="en-US" dirty="0" smtClean="0"/>
+              <a:t> et al. (2009)</a:t>
+            </a:r>
+          </a:p>
+          <a:p>
+            <a:pPr lvl="1"/>
+            <a:r>
+              <a:rPr lang="en-US" dirty="0" err="1"/>
+              <a:t>m</a:t>
             </a:r>
             <a:r>
               <a:rPr lang="en-US" dirty="0" err="1" smtClean="0"/>
-              <a:t>PyMol</a:t>
-            </a:r>
-            <a:r>
-              <a:rPr lang="en-US" dirty="0" smtClean="0"/>
-              <a:t> (show pictures)</a:t>
-            </a:r>
+              <a:t>olpdf</a:t>
+            </a:r>
+            <a:r>
+              <a:rPr lang="en-US" dirty="0" smtClean="0"/>
+              <a:t>, GA341 and DOPE (all built-in)</a:t>
+            </a:r>
+            <a:endParaRPr lang="en-US" dirty="0"/>
+          </a:p>
+          <a:p>
+            <a:r>
+              <a:rPr lang="en-US" dirty="0" smtClean="0"/>
+              <a:t>…</a:t>
+            </a:r>
+            <a:r>
+              <a:rPr lang="en-US" dirty="0" smtClean="0"/>
+              <a:t>can be done visually in </a:t>
+            </a:r>
+            <a:r>
+              <a:rPr lang="en-US" dirty="0" err="1" smtClean="0"/>
+              <a:t>PyMOL</a:t>
+            </a:r>
+            <a:endParaRPr lang="en-US" dirty="0"/>
           </a:p>
           <a:p>
             <a:pPr lvl="1"/>
             <a:r>
               <a:rPr lang="en-US" dirty="0" smtClean="0"/>
-              <a:t>With true structure (sanity check)</a:t>
-            </a:r>
+              <a:t>With </a:t>
+            </a:r>
+            <a:r>
+              <a:rPr lang="en-US" dirty="0" smtClean="0"/>
+              <a:t>true structure </a:t>
+            </a:r>
+            <a:r>
+              <a:rPr lang="en-US" dirty="0" smtClean="0"/>
+              <a:t>(</a:t>
+            </a:r>
+            <a:r>
+              <a:rPr lang="en-US" dirty="0" err="1" smtClean="0"/>
+              <a:t>Flaig</a:t>
+            </a:r>
+            <a:r>
+              <a:rPr lang="en-US" dirty="0" smtClean="0"/>
+              <a:t> et al. 2005)</a:t>
+            </a:r>
+            <a:endParaRPr lang="en-US" dirty="0" smtClean="0"/>
           </a:p>
           <a:p>
             <a:pPr lvl="1"/>
@@ -4032,6 +5573,13 @@
   <p:clrMapOvr>
     <a:masterClrMapping/>
   </p:clrMapOvr>
+  <p:timing>
+    <p:tnLst>
+      <p:par>
+        <p:cTn xmlns:p14="http://schemas.microsoft.com/office/powerpoint/2010/main" id="1" dur="indefinite" restart="never" nodeType="tmRoot"/>
+      </p:par>
+    </p:tnLst>
+  </p:timing>
 </p:sld>
 </file>
 
@@ -4069,7 +5617,7 @@
           <a:p>
             <a:r>
               <a:rPr lang="en-US" dirty="0" smtClean="0"/>
-              <a:t>Summary</a:t>
+              <a:t>Results: Prediction checks</a:t>
             </a:r>
             <a:endParaRPr lang="en-US" dirty="0"/>
           </a:p>
@@ -4077,45 +5625,112 @@
       </p:sp>
       <p:sp>
         <p:nvSpPr>
-          <p:cNvPr id="3" name="Content Placeholder 2"/>
-          <p:cNvSpPr>
-            <a:spLocks noGrp="1"/>
-          </p:cNvSpPr>
-          <p:nvPr>
-            <p:ph idx="1"/>
-          </p:nvPr>
-        </p:nvSpPr>
-        <p:spPr/>
-        <p:txBody>
-          <a:bodyPr/>
-          <a:lstStyle/>
-          <a:p>
-            <a:r>
-              <a:rPr lang="en-US" dirty="0" smtClean="0"/>
-              <a:t>Blah blah </a:t>
-            </a:r>
-            <a:r>
-              <a:rPr lang="en-US" dirty="0" err="1" smtClean="0"/>
-              <a:t>Modeller</a:t>
-            </a:r>
-            <a:r>
-              <a:rPr lang="en-US" dirty="0" smtClean="0"/>
-              <a:t> is awesome</a:t>
+          <p:cNvPr id="4" name="Content Placeholder 3"/>
+          <p:cNvSpPr>
+            <a:spLocks noGrp="1"/>
+          </p:cNvSpPr>
+          <p:nvPr>
+            <p:ph sz="half" idx="1"/>
+          </p:nvPr>
+        </p:nvSpPr>
+        <p:spPr/>
+        <p:txBody>
+          <a:bodyPr>
+            <a:normAutofit fontScale="92500" lnSpcReduction="10000"/>
+          </a:bodyPr>
+          <a:lstStyle/>
+          <a:p>
+            <a:r>
+              <a:rPr lang="en-US" dirty="0" smtClean="0"/>
+              <a:t>Top: 1yje:A (red) fitted onto one template (1ovl:A)</a:t>
+            </a:r>
+          </a:p>
+          <a:p>
+            <a:r>
+              <a:rPr lang="en-US" dirty="0" smtClean="0"/>
+              <a:t>Bottom: Predicted structure (red) compared to real one</a:t>
+            </a:r>
+          </a:p>
+          <a:p>
+            <a:r>
+              <a:rPr lang="en-US" dirty="0" smtClean="0"/>
+              <a:t>Note poor fitting of loops, but overall good prediction of secondary structures</a:t>
+            </a:r>
+          </a:p>
+          <a:p>
+            <a:r>
+              <a:rPr lang="en-US" dirty="0" smtClean="0"/>
+              <a:t>DOPE score: -31212</a:t>
             </a:r>
             <a:endParaRPr lang="en-US" dirty="0"/>
           </a:p>
         </p:txBody>
       </p:sp>
+      <p:pic>
+        <p:nvPicPr>
+          <p:cNvPr id="14" name="Picture 13"/>
+          <p:cNvPicPr>
+            <a:picLocks noChangeAspect="1"/>
+          </p:cNvPicPr>
+          <p:nvPr/>
+        </p:nvPicPr>
+        <p:blipFill>
+          <a:blip r:embed="rId2"/>
+          <a:stretch>
+            <a:fillRect/>
+          </a:stretch>
+        </p:blipFill>
+        <p:spPr>
+          <a:xfrm>
+            <a:off x="4495800" y="1600200"/>
+            <a:ext cx="2368614" cy="2368614"/>
+          </a:xfrm>
+          <a:prstGeom prst="rect">
+            <a:avLst/>
+          </a:prstGeom>
+        </p:spPr>
+      </p:pic>
+      <p:pic>
+        <p:nvPicPr>
+          <p:cNvPr id="15" name="Picture 14"/>
+          <p:cNvPicPr>
+            <a:picLocks noChangeAspect="1"/>
+          </p:cNvPicPr>
+          <p:nvPr/>
+        </p:nvPicPr>
+        <p:blipFill>
+          <a:blip r:embed="rId3"/>
+          <a:stretch>
+            <a:fillRect/>
+          </a:stretch>
+        </p:blipFill>
+        <p:spPr>
+          <a:xfrm>
+            <a:off x="4495800" y="3968814"/>
+            <a:ext cx="2368614" cy="2368614"/>
+          </a:xfrm>
+          <a:prstGeom prst="rect">
+            <a:avLst/>
+          </a:prstGeom>
+        </p:spPr>
+      </p:pic>
     </p:spTree>
     <p:extLst>
       <p:ext uri="{BB962C8B-B14F-4D97-AF65-F5344CB8AC3E}">
-        <p14:creationId xmlns:p14="http://schemas.microsoft.com/office/powerpoint/2010/main" val="3602655252"/>
+        <p14:creationId xmlns:p14="http://schemas.microsoft.com/office/powerpoint/2010/main" val="217791218"/>
       </p:ext>
     </p:extLst>
   </p:cSld>
   <p:clrMapOvr>
     <a:masterClrMapping/>
   </p:clrMapOvr>
+  <p:timing>
+    <p:tnLst>
+      <p:par>
+        <p:cTn xmlns:p14="http://schemas.microsoft.com/office/powerpoint/2010/main" id="1" dur="indefinite" restart="never" nodeType="tmRoot"/>
+      </p:par>
+    </p:tnLst>
+  </p:timing>
 </p:sld>
 </file>
 

</xml_diff>